<commit_message>
update word and slide
</commit_message>
<xml_diff>
--- a/DATN_PhamThiThuy.pptx
+++ b/DATN_PhamThiThuy.pptx
@@ -17,8 +17,8 @@
     <p:sldId id="259" r:id="rId5"/>
     <p:sldId id="260" r:id="rId6"/>
     <p:sldId id="261" r:id="rId7"/>
-    <p:sldId id="292" r:id="rId8"/>
-    <p:sldId id="297" r:id="rId9"/>
+    <p:sldId id="297" r:id="rId8"/>
+    <p:sldId id="292" r:id="rId9"/>
     <p:sldId id="294" r:id="rId10"/>
     <p:sldId id="291" r:id="rId11"/>
     <p:sldId id="293" r:id="rId12"/>
@@ -239,7 +239,7 @@
           <a:p>
             <a:fld id="{25DD1B1C-C497-421F-B06C-F532CF0F9785}" type="datetimeFigureOut">
               <a:rPr lang="en-US" smtClean="0"/>
-              <a:t>2020-12-11</a:t>
+              <a:t>2020-12-16</a:t>
             </a:fld>
             <a:endParaRPr lang="en-US"/>
           </a:p>
@@ -417,7 +417,7 @@
           <a:p>
             <a:fld id="{7CD4A5DF-C9ED-4331-9C0A-D1B49AAB54A9}" type="datetimeFigureOut">
               <a:rPr lang="en-US" smtClean="0"/>
-              <a:t>2020-12-11</a:t>
+              <a:t>2020-12-16</a:t>
             </a:fld>
             <a:endParaRPr lang="en-US"/>
           </a:p>
@@ -1821,7 +1821,7 @@
           <a:bodyPr/>
           <a:lstStyle/>
           <a:p>
-            <a:endParaRPr lang="en-US" dirty="0"/>
+            <a:endParaRPr lang="en-US"/>
           </a:p>
         </p:txBody>
       </p:sp>
@@ -1851,7 +1851,7 @@
     </p:spTree>
     <p:extLst>
       <p:ext uri="{BB962C8B-B14F-4D97-AF65-F5344CB8AC3E}">
-        <p14:creationId xmlns:p14="http://schemas.microsoft.com/office/powerpoint/2010/main" val="870631648"/>
+        <p14:creationId xmlns:p14="http://schemas.microsoft.com/office/powerpoint/2010/main" val="590502251"/>
       </p:ext>
     </p:extLst>
   </p:cSld>
@@ -1905,7 +1905,7 @@
           <a:bodyPr/>
           <a:lstStyle/>
           <a:p>
-            <a:endParaRPr lang="en-US"/>
+            <a:endParaRPr lang="en-US" dirty="0"/>
           </a:p>
         </p:txBody>
       </p:sp>
@@ -1935,7 +1935,7 @@
     </p:spTree>
     <p:extLst>
       <p:ext uri="{BB962C8B-B14F-4D97-AF65-F5344CB8AC3E}">
-        <p14:creationId xmlns:p14="http://schemas.microsoft.com/office/powerpoint/2010/main" val="590502251"/>
+        <p14:creationId xmlns:p14="http://schemas.microsoft.com/office/powerpoint/2010/main" val="870631648"/>
       </p:ext>
     </p:extLst>
   </p:cSld>
@@ -2176,7 +2176,7 @@
           <a:p>
             <a:fld id="{913B9D1B-8B7F-4F2A-BB55-C21DE162B8AE}" type="datetime1">
               <a:rPr lang="vi-VN" smtClean="0"/>
-              <a:t>11/12/2020</a:t>
+              <a:t>16/12/2020</a:t>
             </a:fld>
             <a:endParaRPr lang="en-US"/>
           </a:p>
@@ -2375,7 +2375,7 @@
           <a:p>
             <a:fld id="{54C2DB50-FFA4-4032-9F03-8BC477969725}" type="datetime1">
               <a:rPr lang="vi-VN" smtClean="0"/>
-              <a:t>11/12/2020</a:t>
+              <a:t>16/12/2020</a:t>
             </a:fld>
             <a:endParaRPr lang="en-US"/>
           </a:p>
@@ -2584,7 +2584,7 @@
           <a:p>
             <a:fld id="{ABE0B1BD-9F28-4969-BFBF-2AC2D08FF176}" type="datetime1">
               <a:rPr lang="vi-VN" smtClean="0"/>
-              <a:t>11/12/2020</a:t>
+              <a:t>16/12/2020</a:t>
             </a:fld>
             <a:endParaRPr lang="en-US"/>
           </a:p>
@@ -2783,7 +2783,7 @@
           <a:p>
             <a:fld id="{4AE99753-14BD-4C19-89AD-69A137A5857A}" type="datetime1">
               <a:rPr lang="vi-VN" smtClean="0"/>
-              <a:t>11/12/2020</a:t>
+              <a:t>16/12/2020</a:t>
             </a:fld>
             <a:endParaRPr lang="en-US"/>
           </a:p>
@@ -3059,7 +3059,7 @@
           <a:p>
             <a:fld id="{D65F6F36-BB06-4F13-9611-851319F3392B}" type="datetime1">
               <a:rPr lang="vi-VN" smtClean="0"/>
-              <a:t>11/12/2020</a:t>
+              <a:t>16/12/2020</a:t>
             </a:fld>
             <a:endParaRPr lang="en-US"/>
           </a:p>
@@ -3325,7 +3325,7 @@
           <a:p>
             <a:fld id="{17D20409-82E2-4CE7-923C-CF5475366411}" type="datetime1">
               <a:rPr lang="vi-VN" smtClean="0"/>
-              <a:t>11/12/2020</a:t>
+              <a:t>16/12/2020</a:t>
             </a:fld>
             <a:endParaRPr lang="en-US"/>
           </a:p>
@@ -3738,7 +3738,7 @@
           <a:p>
             <a:fld id="{D6B602A3-B6BD-4B11-9EF7-A6995DD1D891}" type="datetime1">
               <a:rPr lang="vi-VN" smtClean="0"/>
-              <a:t>11/12/2020</a:t>
+              <a:t>16/12/2020</a:t>
             </a:fld>
             <a:endParaRPr lang="en-US"/>
           </a:p>
@@ -3880,7 +3880,7 @@
           <a:p>
             <a:fld id="{BD5774EA-1465-4714-ABCA-238E21FB1E99}" type="datetime1">
               <a:rPr lang="vi-VN" smtClean="0"/>
-              <a:t>11/12/2020</a:t>
+              <a:t>16/12/2020</a:t>
             </a:fld>
             <a:endParaRPr lang="en-US"/>
           </a:p>
@@ -3994,7 +3994,7 @@
           <a:p>
             <a:fld id="{1393677C-A199-48B1-9AE1-138834C1B67E}" type="datetime1">
               <a:rPr lang="vi-VN" smtClean="0"/>
-              <a:t>11/12/2020</a:t>
+              <a:t>16/12/2020</a:t>
             </a:fld>
             <a:endParaRPr lang="en-US"/>
           </a:p>
@@ -4306,7 +4306,7 @@
           <a:p>
             <a:fld id="{B6459F17-2D45-4809-A88D-60C6D948D5D9}" type="datetime1">
               <a:rPr lang="vi-VN" smtClean="0"/>
-              <a:t>11/12/2020</a:t>
+              <a:t>16/12/2020</a:t>
             </a:fld>
             <a:endParaRPr lang="en-US"/>
           </a:p>
@@ -4595,7 +4595,7 @@
           <a:p>
             <a:fld id="{B806E17E-5A62-4990-8004-1AAC05D07EF7}" type="datetime1">
               <a:rPr lang="vi-VN" smtClean="0"/>
-              <a:t>11/12/2020</a:t>
+              <a:t>16/12/2020</a:t>
             </a:fld>
             <a:endParaRPr lang="en-US"/>
           </a:p>
@@ -4837,7 +4837,7 @@
           <a:p>
             <a:fld id="{32F45394-1329-4267-AC9F-AB803F30FFC4}" type="datetime1">
               <a:rPr lang="vi-VN" smtClean="0"/>
-              <a:t>11/12/2020</a:t>
+              <a:t>16/12/2020</a:t>
             </a:fld>
             <a:endParaRPr lang="en-US"/>
           </a:p>
@@ -14530,10 +14530,10 @@
       </p:grpSpPr>
       <p:sp>
         <p:nvSpPr>
-          <p:cNvPr id="17" name="TextBox 16">
+          <p:cNvPr id="13" name="TextBox 12">
             <a:extLst>
               <a:ext uri="{FF2B5EF4-FFF2-40B4-BE49-F238E27FC236}">
-                <a16:creationId xmlns:a16="http://schemas.microsoft.com/office/drawing/2014/main" id="{D8F1E7DF-43FD-4D73-A997-B3BC22AC61DA}"/>
+                <a16:creationId xmlns:a16="http://schemas.microsoft.com/office/drawing/2014/main" id="{19DC4F66-C4A3-41EA-8A8D-E15145026D08}"/>
               </a:ext>
             </a:extLst>
           </p:cNvPr>
@@ -14542,7 +14542,7 @@
         </p:nvSpPr>
         <p:spPr>
           <a:xfrm>
-            <a:off x="681671" y="1066800"/>
+            <a:off x="519430" y="1040548"/>
             <a:ext cx="4804729" cy="461665"/>
           </a:xfrm>
           <a:prstGeom prst="rect">
@@ -14561,20 +14561,36 @@
               <a:buChar char="v"/>
             </a:pPr>
             <a:r>
+              <a:rPr lang="en-US" sz="2400" dirty="0" err="1">
+                <a:latin typeface="Times New Roman" panose="02020603050405020304" pitchFamily="18" charset="0"/>
+                <a:ea typeface="Roboto" panose="02000000000000000000" pitchFamily="2" charset="0"/>
+                <a:cs typeface="Times New Roman" panose="02020603050405020304" pitchFamily="18" charset="0"/>
+              </a:rPr>
+              <a:t>Chức</a:t>
+            </a:r>
+            <a:r>
               <a:rPr lang="en-US" sz="2400" dirty="0">
                 <a:latin typeface="Times New Roman" panose="02020603050405020304" pitchFamily="18" charset="0"/>
                 <a:ea typeface="Roboto" panose="02000000000000000000" pitchFamily="2" charset="0"/>
                 <a:cs typeface="Times New Roman" panose="02020603050405020304" pitchFamily="18" charset="0"/>
               </a:rPr>
-              <a:t>L</a:t>
-            </a:r>
-            <a:r>
-              <a:rPr lang="vi-VN" sz="2400" dirty="0">
+              <a:t> </a:t>
+            </a:r>
+            <a:r>
+              <a:rPr lang="en-US" sz="2400" dirty="0" err="1">
                 <a:latin typeface="Times New Roman" panose="02020603050405020304" pitchFamily="18" charset="0"/>
                 <a:ea typeface="Roboto" panose="02000000000000000000" pitchFamily="2" charset="0"/>
                 <a:cs typeface="Times New Roman" panose="02020603050405020304" pitchFamily="18" charset="0"/>
               </a:rPr>
-              <a:t>ư</a:t>
+              <a:t>năng</a:t>
+            </a:r>
+            <a:r>
+              <a:rPr lang="en-US" sz="2400" dirty="0">
+                <a:latin typeface="Times New Roman" panose="02020603050405020304" pitchFamily="18" charset="0"/>
+                <a:ea typeface="Roboto" panose="02000000000000000000" pitchFamily="2" charset="0"/>
+                <a:cs typeface="Times New Roman" panose="02020603050405020304" pitchFamily="18" charset="0"/>
+              </a:rPr>
+              <a:t> </a:t>
             </a:r>
             <a:r>
               <a:rPr lang="en-US" sz="2400" dirty="0" err="1">
@@ -14582,7 +14598,7 @@
                 <a:ea typeface="Roboto" panose="02000000000000000000" pitchFamily="2" charset="0"/>
                 <a:cs typeface="Times New Roman" panose="02020603050405020304" pitchFamily="18" charset="0"/>
               </a:rPr>
-              <a:t>ợc</a:t>
+              <a:t>của</a:t>
             </a:r>
             <a:r>
               <a:rPr lang="en-US" sz="2400" dirty="0">
@@ -14590,23 +14606,7 @@
                 <a:ea typeface="Roboto" panose="02000000000000000000" pitchFamily="2" charset="0"/>
                 <a:cs typeface="Times New Roman" panose="02020603050405020304" pitchFamily="18" charset="0"/>
               </a:rPr>
-              <a:t> </a:t>
-            </a:r>
-            <a:r>
-              <a:rPr lang="en-US" sz="2400" dirty="0" err="1">
-                <a:latin typeface="Times New Roman" panose="02020603050405020304" pitchFamily="18" charset="0"/>
-                <a:ea typeface="Roboto" panose="02000000000000000000" pitchFamily="2" charset="0"/>
-                <a:cs typeface="Times New Roman" panose="02020603050405020304" pitchFamily="18" charset="0"/>
-              </a:rPr>
-              <a:t>đồ</a:t>
-            </a:r>
-            <a:r>
-              <a:rPr lang="en-US" sz="2400" dirty="0">
-                <a:latin typeface="Times New Roman" panose="02020603050405020304" pitchFamily="18" charset="0"/>
-                <a:ea typeface="Roboto" panose="02000000000000000000" pitchFamily="2" charset="0"/>
-                <a:cs typeface="Times New Roman" panose="02020603050405020304" pitchFamily="18" charset="0"/>
-              </a:rPr>
-              <a:t> Use case admin</a:t>
+              <a:t> admin</a:t>
             </a:r>
             <a:endParaRPr lang="en-US" sz="2400" dirty="0"/>
           </a:p>
@@ -14614,76 +14614,10 @@
       </p:sp>
       <p:sp>
         <p:nvSpPr>
-          <p:cNvPr id="2" name="Slide Number Placeholder 1">
+          <p:cNvPr id="26" name="Title 1">
             <a:extLst>
               <a:ext uri="{FF2B5EF4-FFF2-40B4-BE49-F238E27FC236}">
-                <a16:creationId xmlns:a16="http://schemas.microsoft.com/office/drawing/2014/main" id="{459987A5-E716-4620-BB07-A0CDDA828230}"/>
-              </a:ext>
-            </a:extLst>
-          </p:cNvPr>
-          <p:cNvSpPr>
-            <a:spLocks noGrp="1"/>
-          </p:cNvSpPr>
-          <p:nvPr>
-            <p:ph type="sldNum" sz="quarter" idx="12"/>
-          </p:nvPr>
-        </p:nvSpPr>
-        <p:spPr/>
-        <p:txBody>
-          <a:bodyPr/>
-          <a:lstStyle/>
-          <a:p>
-            <a:fld id="{B6F15528-21DE-4FAA-801E-634DDDAF4B2B}" type="slidenum">
-              <a:rPr lang="en-US" smtClean="0"/>
-              <a:pPr/>
-              <a:t>7</a:t>
-            </a:fld>
-            <a:endParaRPr lang="en-US"/>
-          </a:p>
-        </p:txBody>
-      </p:sp>
-      <p:pic>
-        <p:nvPicPr>
-          <p:cNvPr id="4" name="Picture 3">
-            <a:extLst>
-              <a:ext uri="{FF2B5EF4-FFF2-40B4-BE49-F238E27FC236}">
-                <a16:creationId xmlns:a16="http://schemas.microsoft.com/office/drawing/2014/main" id="{CE7EB83C-9563-41C4-BED6-129C2EA1B6A3}"/>
-              </a:ext>
-            </a:extLst>
-          </p:cNvPr>
-          <p:cNvPicPr>
-            <a:picLocks noChangeAspect="1"/>
-          </p:cNvPicPr>
-          <p:nvPr/>
-        </p:nvPicPr>
-        <p:blipFill>
-          <a:blip r:embed="rId3" cstate="print">
-            <a:extLst>
-              <a:ext uri="{28A0092B-C50C-407E-A947-70E740481C1C}">
-                <a14:useLocalDpi xmlns:a14="http://schemas.microsoft.com/office/drawing/2010/main" val="0"/>
-              </a:ext>
-            </a:extLst>
-          </a:blip>
-          <a:stretch>
-            <a:fillRect/>
-          </a:stretch>
-        </p:blipFill>
-        <p:spPr>
-          <a:xfrm>
-            <a:off x="1143000" y="1433837"/>
-            <a:ext cx="6988571" cy="5299095"/>
-          </a:xfrm>
-          <a:prstGeom prst="rect">
-            <a:avLst/>
-          </a:prstGeom>
-        </p:spPr>
-      </p:pic>
-      <p:sp>
-        <p:nvSpPr>
-          <p:cNvPr id="9" name="Title 1">
-            <a:extLst>
-              <a:ext uri="{FF2B5EF4-FFF2-40B4-BE49-F238E27FC236}">
-                <a16:creationId xmlns:a16="http://schemas.microsoft.com/office/drawing/2014/main" id="{69C7D1DC-8CE4-4070-9783-CB4CB0AC3DE0}"/>
+                <a16:creationId xmlns:a16="http://schemas.microsoft.com/office/drawing/2014/main" id="{B9A36588-B7A6-45F2-AF03-244BAA5D3272}"/>
               </a:ext>
             </a:extLst>
           </p:cNvPr>
@@ -14694,8 +14628,8 @@
         </p:nvSpPr>
         <p:spPr>
           <a:xfrm>
-            <a:off x="301752" y="457200"/>
-            <a:ext cx="8534400" cy="683555"/>
+            <a:off x="554990" y="505858"/>
+            <a:ext cx="8534400" cy="560914"/>
           </a:xfrm>
           <a:prstGeom prst="rect">
             <a:avLst/>
@@ -14739,181 +14673,6 @@
           </a:p>
         </p:txBody>
       </p:sp>
-    </p:spTree>
-    <p:extLst>
-      <p:ext uri="{BB962C8B-B14F-4D97-AF65-F5344CB8AC3E}">
-        <p14:creationId xmlns:p14="http://schemas.microsoft.com/office/powerpoint/2010/main" val="1707396965"/>
-      </p:ext>
-    </p:extLst>
-  </p:cSld>
-  <p:clrMapOvr>
-    <a:masterClrMapping/>
-  </p:clrMapOvr>
-</p:sld>
-</file>
-
-<file path=ppt/slides/slide8.xml><?xml version="1.0" encoding="utf-8"?>
-<p:sld xmlns:a="http://schemas.openxmlformats.org/drawingml/2006/main" xmlns:r="http://schemas.openxmlformats.org/officeDocument/2006/relationships" xmlns:p="http://schemas.openxmlformats.org/presentationml/2006/main">
-  <p:cSld>
-    <p:spTree>
-      <p:nvGrpSpPr>
-        <p:cNvPr id="1" name=""/>
-        <p:cNvGrpSpPr/>
-        <p:nvPr/>
-      </p:nvGrpSpPr>
-      <p:grpSpPr>
-        <a:xfrm>
-          <a:off x="0" y="0"/>
-          <a:ext cx="0" cy="0"/>
-          <a:chOff x="0" y="0"/>
-          <a:chExt cx="0" cy="0"/>
-        </a:xfrm>
-      </p:grpSpPr>
-      <p:sp>
-        <p:nvSpPr>
-          <p:cNvPr id="13" name="TextBox 12">
-            <a:extLst>
-              <a:ext uri="{FF2B5EF4-FFF2-40B4-BE49-F238E27FC236}">
-                <a16:creationId xmlns:a16="http://schemas.microsoft.com/office/drawing/2014/main" id="{19DC4F66-C4A3-41EA-8A8D-E15145026D08}"/>
-              </a:ext>
-            </a:extLst>
-          </p:cNvPr>
-          <p:cNvSpPr txBox="1"/>
-          <p:nvPr/>
-        </p:nvSpPr>
-        <p:spPr>
-          <a:xfrm>
-            <a:off x="519430" y="1040548"/>
-            <a:ext cx="4804729" cy="461665"/>
-          </a:xfrm>
-          <a:prstGeom prst="rect">
-            <a:avLst/>
-          </a:prstGeom>
-          <a:noFill/>
-        </p:spPr>
-        <p:txBody>
-          <a:bodyPr wrap="square" rtlCol="0">
-            <a:spAutoFit/>
-          </a:bodyPr>
-          <a:lstStyle/>
-          <a:p>
-            <a:pPr marL="342900" indent="-342900">
-              <a:buFont typeface="Wingdings" panose="05000000000000000000" pitchFamily="2" charset="2"/>
-              <a:buChar char="v"/>
-            </a:pPr>
-            <a:r>
-              <a:rPr lang="en-US" sz="2400" dirty="0" err="1">
-                <a:latin typeface="Times New Roman" panose="02020603050405020304" pitchFamily="18" charset="0"/>
-                <a:ea typeface="Roboto" panose="02000000000000000000" pitchFamily="2" charset="0"/>
-                <a:cs typeface="Times New Roman" panose="02020603050405020304" pitchFamily="18" charset="0"/>
-              </a:rPr>
-              <a:t>Chức</a:t>
-            </a:r>
-            <a:r>
-              <a:rPr lang="en-US" sz="2400" dirty="0">
-                <a:latin typeface="Times New Roman" panose="02020603050405020304" pitchFamily="18" charset="0"/>
-                <a:ea typeface="Roboto" panose="02000000000000000000" pitchFamily="2" charset="0"/>
-                <a:cs typeface="Times New Roman" panose="02020603050405020304" pitchFamily="18" charset="0"/>
-              </a:rPr>
-              <a:t> </a:t>
-            </a:r>
-            <a:r>
-              <a:rPr lang="en-US" sz="2400" dirty="0" err="1">
-                <a:latin typeface="Times New Roman" panose="02020603050405020304" pitchFamily="18" charset="0"/>
-                <a:ea typeface="Roboto" panose="02000000000000000000" pitchFamily="2" charset="0"/>
-                <a:cs typeface="Times New Roman" panose="02020603050405020304" pitchFamily="18" charset="0"/>
-              </a:rPr>
-              <a:t>năng</a:t>
-            </a:r>
-            <a:r>
-              <a:rPr lang="en-US" sz="2400" dirty="0">
-                <a:latin typeface="Times New Roman" panose="02020603050405020304" pitchFamily="18" charset="0"/>
-                <a:ea typeface="Roboto" panose="02000000000000000000" pitchFamily="2" charset="0"/>
-                <a:cs typeface="Times New Roman" panose="02020603050405020304" pitchFamily="18" charset="0"/>
-              </a:rPr>
-              <a:t> </a:t>
-            </a:r>
-            <a:r>
-              <a:rPr lang="en-US" sz="2400" dirty="0" err="1">
-                <a:latin typeface="Times New Roman" panose="02020603050405020304" pitchFamily="18" charset="0"/>
-                <a:ea typeface="Roboto" panose="02000000000000000000" pitchFamily="2" charset="0"/>
-                <a:cs typeface="Times New Roman" panose="02020603050405020304" pitchFamily="18" charset="0"/>
-              </a:rPr>
-              <a:t>của</a:t>
-            </a:r>
-            <a:r>
-              <a:rPr lang="en-US" sz="2400" dirty="0">
-                <a:latin typeface="Times New Roman" panose="02020603050405020304" pitchFamily="18" charset="0"/>
-                <a:ea typeface="Roboto" panose="02000000000000000000" pitchFamily="2" charset="0"/>
-                <a:cs typeface="Times New Roman" panose="02020603050405020304" pitchFamily="18" charset="0"/>
-              </a:rPr>
-              <a:t> admin</a:t>
-            </a:r>
-            <a:endParaRPr lang="en-US" sz="2400" dirty="0"/>
-          </a:p>
-        </p:txBody>
-      </p:sp>
-      <p:sp>
-        <p:nvSpPr>
-          <p:cNvPr id="26" name="Title 1">
-            <a:extLst>
-              <a:ext uri="{FF2B5EF4-FFF2-40B4-BE49-F238E27FC236}">
-                <a16:creationId xmlns:a16="http://schemas.microsoft.com/office/drawing/2014/main" id="{B9A36588-B7A6-45F2-AF03-244BAA5D3272}"/>
-              </a:ext>
-            </a:extLst>
-          </p:cNvPr>
-          <p:cNvSpPr txBox="1">
-            <a:spLocks/>
-          </p:cNvSpPr>
-          <p:nvPr/>
-        </p:nvSpPr>
-        <p:spPr>
-          <a:xfrm>
-            <a:off x="554990" y="505858"/>
-            <a:ext cx="8534400" cy="560914"/>
-          </a:xfrm>
-          <a:prstGeom prst="rect">
-            <a:avLst/>
-          </a:prstGeom>
-        </p:spPr>
-        <p:txBody>
-          <a:bodyPr vert="horz" lIns="91440" tIns="45720" rIns="91440" bIns="45720" rtlCol="0" anchor="ctr">
-            <a:normAutofit/>
-          </a:bodyPr>
-          <a:lstStyle>
-            <a:lvl1pPr algn="l" defTabSz="685800" rtl="0" eaLnBrk="1" latinLnBrk="0" hangingPunct="1">
-              <a:lnSpc>
-                <a:spcPct val="90000"/>
-              </a:lnSpc>
-              <a:spcBef>
-                <a:spcPct val="0"/>
-              </a:spcBef>
-              <a:buNone/>
-              <a:defRPr sz="3300" kern="1200">
-                <a:solidFill>
-                  <a:schemeClr val="tx1"/>
-                </a:solidFill>
-                <a:latin typeface="+mj-lt"/>
-                <a:ea typeface="+mj-ea"/>
-                <a:cs typeface="+mj-cs"/>
-              </a:defRPr>
-            </a:lvl1pPr>
-          </a:lstStyle>
-          <a:p>
-            <a:pPr algn="ctr"/>
-            <a:r>
-              <a:rPr lang="en-US" sz="3200" b="1" dirty="0">
-                <a:solidFill>
-                  <a:schemeClr val="accent1"/>
-                </a:solidFill>
-                <a:latin typeface="Times New Roman" panose="02020603050405020304" pitchFamily="18" charset="0"/>
-                <a:cs typeface="Times New Roman" panose="02020603050405020304" pitchFamily="18" charset="0"/>
-              </a:rPr>
-              <a:t>III. PHÂN TÍCH &amp; THIẾT KẾ HỆ THỐNG</a:t>
-            </a:r>
-          </a:p>
-        </p:txBody>
-      </p:sp>
       <p:sp>
         <p:nvSpPr>
           <p:cNvPr id="2" name="Slide Number Placeholder 1">
@@ -14938,7 +14697,7 @@
             <a:fld id="{B6F15528-21DE-4FAA-801E-634DDDAF4B2B}" type="slidenum">
               <a:rPr lang="en-US" smtClean="0"/>
               <a:pPr/>
-              <a:t>8</a:t>
+              <a:t>7</a:t>
             </a:fld>
             <a:endParaRPr lang="en-US"/>
           </a:p>
@@ -15607,6 +15366,271 @@
 </p:sld>
 </file>
 
+<file path=ppt/slides/slide8.xml><?xml version="1.0" encoding="utf-8"?>
+<p:sld xmlns:a="http://schemas.openxmlformats.org/drawingml/2006/main" xmlns:r="http://schemas.openxmlformats.org/officeDocument/2006/relationships" xmlns:p="http://schemas.openxmlformats.org/presentationml/2006/main">
+  <p:cSld>
+    <p:spTree>
+      <p:nvGrpSpPr>
+        <p:cNvPr id="1" name=""/>
+        <p:cNvGrpSpPr/>
+        <p:nvPr/>
+      </p:nvGrpSpPr>
+      <p:grpSpPr>
+        <a:xfrm>
+          <a:off x="0" y="0"/>
+          <a:ext cx="0" cy="0"/>
+          <a:chOff x="0" y="0"/>
+          <a:chExt cx="0" cy="0"/>
+        </a:xfrm>
+      </p:grpSpPr>
+      <p:sp>
+        <p:nvSpPr>
+          <p:cNvPr id="17" name="TextBox 16">
+            <a:extLst>
+              <a:ext uri="{FF2B5EF4-FFF2-40B4-BE49-F238E27FC236}">
+                <a16:creationId xmlns:a16="http://schemas.microsoft.com/office/drawing/2014/main" id="{D8F1E7DF-43FD-4D73-A997-B3BC22AC61DA}"/>
+              </a:ext>
+            </a:extLst>
+          </p:cNvPr>
+          <p:cNvSpPr txBox="1"/>
+          <p:nvPr/>
+        </p:nvSpPr>
+        <p:spPr>
+          <a:xfrm>
+            <a:off x="681671" y="1066800"/>
+            <a:ext cx="4804729" cy="461665"/>
+          </a:xfrm>
+          <a:prstGeom prst="rect">
+            <a:avLst/>
+          </a:prstGeom>
+          <a:noFill/>
+        </p:spPr>
+        <p:txBody>
+          <a:bodyPr wrap="square" rtlCol="0">
+            <a:spAutoFit/>
+          </a:bodyPr>
+          <a:lstStyle/>
+          <a:p>
+            <a:pPr marL="342900" indent="-342900">
+              <a:buFont typeface="Wingdings" panose="05000000000000000000" pitchFamily="2" charset="2"/>
+              <a:buChar char="v"/>
+            </a:pPr>
+            <a:r>
+              <a:rPr lang="en-US" sz="2400" dirty="0">
+                <a:latin typeface="Times New Roman" panose="02020603050405020304" pitchFamily="18" charset="0"/>
+                <a:ea typeface="Roboto" panose="02000000000000000000" pitchFamily="2" charset="0"/>
+                <a:cs typeface="Times New Roman" panose="02020603050405020304" pitchFamily="18" charset="0"/>
+              </a:rPr>
+              <a:t>L</a:t>
+            </a:r>
+            <a:r>
+              <a:rPr lang="vi-VN" sz="2400" dirty="0">
+                <a:latin typeface="Times New Roman" panose="02020603050405020304" pitchFamily="18" charset="0"/>
+                <a:ea typeface="Roboto" panose="02000000000000000000" pitchFamily="2" charset="0"/>
+                <a:cs typeface="Times New Roman" panose="02020603050405020304" pitchFamily="18" charset="0"/>
+              </a:rPr>
+              <a:t>ư</a:t>
+            </a:r>
+            <a:r>
+              <a:rPr lang="en-US" sz="2400" dirty="0" err="1">
+                <a:latin typeface="Times New Roman" panose="02020603050405020304" pitchFamily="18" charset="0"/>
+                <a:ea typeface="Roboto" panose="02000000000000000000" pitchFamily="2" charset="0"/>
+                <a:cs typeface="Times New Roman" panose="02020603050405020304" pitchFamily="18" charset="0"/>
+              </a:rPr>
+              <a:t>ợc</a:t>
+            </a:r>
+            <a:r>
+              <a:rPr lang="en-US" sz="2400" dirty="0">
+                <a:latin typeface="Times New Roman" panose="02020603050405020304" pitchFamily="18" charset="0"/>
+                <a:ea typeface="Roboto" panose="02000000000000000000" pitchFamily="2" charset="0"/>
+                <a:cs typeface="Times New Roman" panose="02020603050405020304" pitchFamily="18" charset="0"/>
+              </a:rPr>
+              <a:t> </a:t>
+            </a:r>
+            <a:r>
+              <a:rPr lang="en-US" sz="2400" dirty="0" err="1">
+                <a:latin typeface="Times New Roman" panose="02020603050405020304" pitchFamily="18" charset="0"/>
+                <a:ea typeface="Roboto" panose="02000000000000000000" pitchFamily="2" charset="0"/>
+                <a:cs typeface="Times New Roman" panose="02020603050405020304" pitchFamily="18" charset="0"/>
+              </a:rPr>
+              <a:t>đồ</a:t>
+            </a:r>
+            <a:r>
+              <a:rPr lang="en-US" sz="2400" dirty="0">
+                <a:latin typeface="Times New Roman" panose="02020603050405020304" pitchFamily="18" charset="0"/>
+                <a:ea typeface="Roboto" panose="02000000000000000000" pitchFamily="2" charset="0"/>
+                <a:cs typeface="Times New Roman" panose="02020603050405020304" pitchFamily="18" charset="0"/>
+              </a:rPr>
+              <a:t> Use case </a:t>
+            </a:r>
+            <a:r>
+              <a:rPr lang="en-US" sz="2400" dirty="0" err="1">
+                <a:latin typeface="Times New Roman" panose="02020603050405020304" pitchFamily="18" charset="0"/>
+                <a:ea typeface="Roboto" panose="02000000000000000000" pitchFamily="2" charset="0"/>
+                <a:cs typeface="Times New Roman" panose="02020603050405020304" pitchFamily="18" charset="0"/>
+              </a:rPr>
+              <a:t>nhân</a:t>
+            </a:r>
+            <a:r>
+              <a:rPr lang="en-US" sz="2400" dirty="0">
+                <a:latin typeface="Times New Roman" panose="02020603050405020304" pitchFamily="18" charset="0"/>
+                <a:ea typeface="Roboto" panose="02000000000000000000" pitchFamily="2" charset="0"/>
+                <a:cs typeface="Times New Roman" panose="02020603050405020304" pitchFamily="18" charset="0"/>
+              </a:rPr>
+              <a:t> </a:t>
+            </a:r>
+            <a:r>
+              <a:rPr lang="en-US" sz="2400" dirty="0" err="1">
+                <a:latin typeface="Times New Roman" panose="02020603050405020304" pitchFamily="18" charset="0"/>
+                <a:ea typeface="Roboto" panose="02000000000000000000" pitchFamily="2" charset="0"/>
+                <a:cs typeface="Times New Roman" panose="02020603050405020304" pitchFamily="18" charset="0"/>
+              </a:rPr>
+              <a:t>viên</a:t>
+            </a:r>
+            <a:endParaRPr lang="en-US" sz="2400" dirty="0"/>
+          </a:p>
+        </p:txBody>
+      </p:sp>
+      <p:sp>
+        <p:nvSpPr>
+          <p:cNvPr id="2" name="Slide Number Placeholder 1">
+            <a:extLst>
+              <a:ext uri="{FF2B5EF4-FFF2-40B4-BE49-F238E27FC236}">
+                <a16:creationId xmlns:a16="http://schemas.microsoft.com/office/drawing/2014/main" id="{459987A5-E716-4620-BB07-A0CDDA828230}"/>
+              </a:ext>
+            </a:extLst>
+          </p:cNvPr>
+          <p:cNvSpPr>
+            <a:spLocks noGrp="1"/>
+          </p:cNvSpPr>
+          <p:nvPr>
+            <p:ph type="sldNum" sz="quarter" idx="12"/>
+          </p:nvPr>
+        </p:nvSpPr>
+        <p:spPr/>
+        <p:txBody>
+          <a:bodyPr/>
+          <a:lstStyle/>
+          <a:p>
+            <a:fld id="{B6F15528-21DE-4FAA-801E-634DDDAF4B2B}" type="slidenum">
+              <a:rPr lang="en-US" smtClean="0"/>
+              <a:pPr/>
+              <a:t>8</a:t>
+            </a:fld>
+            <a:endParaRPr lang="en-US"/>
+          </a:p>
+        </p:txBody>
+      </p:sp>
+      <p:pic>
+        <p:nvPicPr>
+          <p:cNvPr id="4" name="Picture 3">
+            <a:extLst>
+              <a:ext uri="{FF2B5EF4-FFF2-40B4-BE49-F238E27FC236}">
+                <a16:creationId xmlns:a16="http://schemas.microsoft.com/office/drawing/2014/main" id="{CE7EB83C-9563-41C4-BED6-129C2EA1B6A3}"/>
+              </a:ext>
+            </a:extLst>
+          </p:cNvPr>
+          <p:cNvPicPr>
+            <a:picLocks noChangeAspect="1"/>
+          </p:cNvPicPr>
+          <p:nvPr/>
+        </p:nvPicPr>
+        <p:blipFill>
+          <a:blip r:embed="rId3" cstate="print">
+            <a:extLst>
+              <a:ext uri="{28A0092B-C50C-407E-A947-70E740481C1C}">
+                <a14:useLocalDpi xmlns:a14="http://schemas.microsoft.com/office/drawing/2010/main" val="0"/>
+              </a:ext>
+            </a:extLst>
+          </a:blip>
+          <a:stretch>
+            <a:fillRect/>
+          </a:stretch>
+        </p:blipFill>
+        <p:spPr>
+          <a:xfrm>
+            <a:off x="1143000" y="1433837"/>
+            <a:ext cx="6988571" cy="5299095"/>
+          </a:xfrm>
+          <a:prstGeom prst="rect">
+            <a:avLst/>
+          </a:prstGeom>
+        </p:spPr>
+      </p:pic>
+      <p:sp>
+        <p:nvSpPr>
+          <p:cNvPr id="9" name="Title 1">
+            <a:extLst>
+              <a:ext uri="{FF2B5EF4-FFF2-40B4-BE49-F238E27FC236}">
+                <a16:creationId xmlns:a16="http://schemas.microsoft.com/office/drawing/2014/main" id="{69C7D1DC-8CE4-4070-9783-CB4CB0AC3DE0}"/>
+              </a:ext>
+            </a:extLst>
+          </p:cNvPr>
+          <p:cNvSpPr txBox="1">
+            <a:spLocks/>
+          </p:cNvSpPr>
+          <p:nvPr/>
+        </p:nvSpPr>
+        <p:spPr>
+          <a:xfrm>
+            <a:off x="301752" y="457200"/>
+            <a:ext cx="8534400" cy="683555"/>
+          </a:xfrm>
+          <a:prstGeom prst="rect">
+            <a:avLst/>
+          </a:prstGeom>
+        </p:spPr>
+        <p:txBody>
+          <a:bodyPr vert="horz" lIns="91440" tIns="45720" rIns="91440" bIns="45720" rtlCol="0" anchor="ctr">
+            <a:normAutofit/>
+          </a:bodyPr>
+          <a:lstStyle>
+            <a:lvl1pPr algn="l" defTabSz="685800" rtl="0" eaLnBrk="1" latinLnBrk="0" hangingPunct="1">
+              <a:lnSpc>
+                <a:spcPct val="90000"/>
+              </a:lnSpc>
+              <a:spcBef>
+                <a:spcPct val="0"/>
+              </a:spcBef>
+              <a:buNone/>
+              <a:defRPr sz="3300" kern="1200">
+                <a:solidFill>
+                  <a:schemeClr val="tx1"/>
+                </a:solidFill>
+                <a:latin typeface="+mj-lt"/>
+                <a:ea typeface="+mj-ea"/>
+                <a:cs typeface="+mj-cs"/>
+              </a:defRPr>
+            </a:lvl1pPr>
+          </a:lstStyle>
+          <a:p>
+            <a:pPr algn="ctr"/>
+            <a:r>
+              <a:rPr lang="en-US" sz="3200" b="1" dirty="0">
+                <a:solidFill>
+                  <a:schemeClr val="accent1"/>
+                </a:solidFill>
+                <a:latin typeface="Times New Roman" panose="02020603050405020304" pitchFamily="18" charset="0"/>
+                <a:cs typeface="Times New Roman" panose="02020603050405020304" pitchFamily="18" charset="0"/>
+              </a:rPr>
+              <a:t>III. PHÂN TÍCH &amp; THIẾT KẾ HỆ THỐNG</a:t>
+            </a:r>
+          </a:p>
+        </p:txBody>
+      </p:sp>
+    </p:spTree>
+    <p:extLst>
+      <p:ext uri="{BB962C8B-B14F-4D97-AF65-F5344CB8AC3E}">
+        <p14:creationId xmlns:p14="http://schemas.microsoft.com/office/powerpoint/2010/main" val="1707396965"/>
+      </p:ext>
+    </p:extLst>
+  </p:cSld>
+  <p:clrMapOvr>
+    <a:masterClrMapping/>
+  </p:clrMapOvr>
+</p:sld>
+</file>
+
 <file path=ppt/slides/slide9.xml><?xml version="1.0" encoding="utf-8"?>
 <p:sld xmlns:a="http://schemas.openxmlformats.org/drawingml/2006/main" xmlns:r="http://schemas.openxmlformats.org/officeDocument/2006/relationships" xmlns:p="http://schemas.openxmlformats.org/presentationml/2006/main">
   <p:cSld>
@@ -15687,138 +15711,6 @@
       </p:sp>
       <p:sp>
         <p:nvSpPr>
-          <p:cNvPr id="17" name="TextBox 16">
-            <a:extLst>
-              <a:ext uri="{FF2B5EF4-FFF2-40B4-BE49-F238E27FC236}">
-                <a16:creationId xmlns:a16="http://schemas.microsoft.com/office/drawing/2014/main" id="{D8F1E7DF-43FD-4D73-A997-B3BC22AC61DA}"/>
-              </a:ext>
-            </a:extLst>
-          </p:cNvPr>
-          <p:cNvSpPr txBox="1"/>
-          <p:nvPr/>
-        </p:nvSpPr>
-        <p:spPr>
-          <a:xfrm>
-            <a:off x="685800" y="1065533"/>
-            <a:ext cx="4804729" cy="461665"/>
-          </a:xfrm>
-          <a:prstGeom prst="rect">
-            <a:avLst/>
-          </a:prstGeom>
-          <a:noFill/>
-        </p:spPr>
-        <p:txBody>
-          <a:bodyPr wrap="square" rtlCol="0">
-            <a:spAutoFit/>
-          </a:bodyPr>
-          <a:lstStyle/>
-          <a:p>
-            <a:pPr marL="342900" indent="-342900">
-              <a:buFont typeface="Wingdings" panose="05000000000000000000" pitchFamily="2" charset="2"/>
-              <a:buChar char="v"/>
-            </a:pPr>
-            <a:r>
-              <a:rPr lang="en-US" sz="2400" dirty="0" err="1">
-                <a:latin typeface="Times New Roman" panose="02020603050405020304" pitchFamily="18" charset="0"/>
-                <a:ea typeface="Roboto" panose="02000000000000000000" pitchFamily="2" charset="0"/>
-                <a:cs typeface="Times New Roman" panose="02020603050405020304" pitchFamily="18" charset="0"/>
-              </a:rPr>
-              <a:t>Mô</a:t>
-            </a:r>
-            <a:r>
-              <a:rPr lang="en-US" sz="2400" dirty="0">
-                <a:latin typeface="Times New Roman" panose="02020603050405020304" pitchFamily="18" charset="0"/>
-                <a:ea typeface="Roboto" panose="02000000000000000000" pitchFamily="2" charset="0"/>
-                <a:cs typeface="Times New Roman" panose="02020603050405020304" pitchFamily="18" charset="0"/>
-              </a:rPr>
-              <a:t> </a:t>
-            </a:r>
-            <a:r>
-              <a:rPr lang="en-US" sz="2400" dirty="0" err="1">
-                <a:latin typeface="Times New Roman" panose="02020603050405020304" pitchFamily="18" charset="0"/>
-                <a:ea typeface="Roboto" panose="02000000000000000000" pitchFamily="2" charset="0"/>
-                <a:cs typeface="Times New Roman" panose="02020603050405020304" pitchFamily="18" charset="0"/>
-              </a:rPr>
-              <a:t>hình</a:t>
-            </a:r>
-            <a:r>
-              <a:rPr lang="en-US" sz="2400" dirty="0">
-                <a:latin typeface="Times New Roman" panose="02020603050405020304" pitchFamily="18" charset="0"/>
-                <a:ea typeface="Roboto" panose="02000000000000000000" pitchFamily="2" charset="0"/>
-                <a:cs typeface="Times New Roman" panose="02020603050405020304" pitchFamily="18" charset="0"/>
-              </a:rPr>
-              <a:t> </a:t>
-            </a:r>
-            <a:r>
-              <a:rPr lang="en-US" sz="2400" dirty="0" err="1">
-                <a:latin typeface="Times New Roman" panose="02020603050405020304" pitchFamily="18" charset="0"/>
-                <a:ea typeface="Roboto" panose="02000000000000000000" pitchFamily="2" charset="0"/>
-                <a:cs typeface="Times New Roman" panose="02020603050405020304" pitchFamily="18" charset="0"/>
-              </a:rPr>
-              <a:t>thực</a:t>
-            </a:r>
-            <a:r>
-              <a:rPr lang="en-US" sz="2400" dirty="0">
-                <a:latin typeface="Times New Roman" panose="02020603050405020304" pitchFamily="18" charset="0"/>
-                <a:ea typeface="Roboto" panose="02000000000000000000" pitchFamily="2" charset="0"/>
-                <a:cs typeface="Times New Roman" panose="02020603050405020304" pitchFamily="18" charset="0"/>
-              </a:rPr>
-              <a:t> </a:t>
-            </a:r>
-            <a:r>
-              <a:rPr lang="en-US" sz="2400" dirty="0" err="1">
-                <a:latin typeface="Times New Roman" panose="02020603050405020304" pitchFamily="18" charset="0"/>
-                <a:ea typeface="Roboto" panose="02000000000000000000" pitchFamily="2" charset="0"/>
-                <a:cs typeface="Times New Roman" panose="02020603050405020304" pitchFamily="18" charset="0"/>
-              </a:rPr>
-              <a:t>thể</a:t>
-            </a:r>
-            <a:r>
-              <a:rPr lang="en-US" sz="2400" dirty="0">
-                <a:latin typeface="Times New Roman" panose="02020603050405020304" pitchFamily="18" charset="0"/>
-                <a:ea typeface="Roboto" panose="02000000000000000000" pitchFamily="2" charset="0"/>
-                <a:cs typeface="Times New Roman" panose="02020603050405020304" pitchFamily="18" charset="0"/>
-              </a:rPr>
-              <a:t> </a:t>
-            </a:r>
-            <a:r>
-              <a:rPr lang="en-US" sz="2400" dirty="0" err="1">
-                <a:latin typeface="Times New Roman" panose="02020603050405020304" pitchFamily="18" charset="0"/>
-                <a:ea typeface="Roboto" panose="02000000000000000000" pitchFamily="2" charset="0"/>
-                <a:cs typeface="Times New Roman" panose="02020603050405020304" pitchFamily="18" charset="0"/>
-              </a:rPr>
-              <a:t>liên</a:t>
-            </a:r>
-            <a:r>
-              <a:rPr lang="en-US" sz="2400" dirty="0">
-                <a:latin typeface="Times New Roman" panose="02020603050405020304" pitchFamily="18" charset="0"/>
-                <a:ea typeface="Roboto" panose="02000000000000000000" pitchFamily="2" charset="0"/>
-                <a:cs typeface="Times New Roman" panose="02020603050405020304" pitchFamily="18" charset="0"/>
-              </a:rPr>
-              <a:t> </a:t>
-            </a:r>
-            <a:r>
-              <a:rPr lang="en-US" sz="2400" dirty="0" err="1">
-                <a:latin typeface="Times New Roman" panose="02020603050405020304" pitchFamily="18" charset="0"/>
-                <a:ea typeface="Roboto" panose="02000000000000000000" pitchFamily="2" charset="0"/>
-                <a:cs typeface="Times New Roman" panose="02020603050405020304" pitchFamily="18" charset="0"/>
-              </a:rPr>
-              <a:t>kết</a:t>
-            </a:r>
-            <a:r>
-              <a:rPr lang="en-US" sz="2400" dirty="0">
-                <a:latin typeface="Times New Roman" panose="02020603050405020304" pitchFamily="18" charset="0"/>
-                <a:ea typeface="Roboto" panose="02000000000000000000" pitchFamily="2" charset="0"/>
-                <a:cs typeface="Times New Roman" panose="02020603050405020304" pitchFamily="18" charset="0"/>
-              </a:rPr>
-              <a:t> ERD</a:t>
-            </a:r>
-            <a:endParaRPr lang="en-US" sz="2400" dirty="0"/>
-          </a:p>
-        </p:txBody>
-      </p:sp>
-      <p:sp>
-        <p:nvSpPr>
           <p:cNvPr id="2" name="Slide Number Placeholder 1">
             <a:extLst>
               <a:ext uri="{FF2B5EF4-FFF2-40B4-BE49-F238E27FC236}">
@@ -15883,6 +15775,113 @@
           </a:prstGeom>
         </p:spPr>
       </p:pic>
+      <p:sp>
+        <p:nvSpPr>
+          <p:cNvPr id="5" name="Rectangle 4">
+            <a:extLst>
+              <a:ext uri="{FF2B5EF4-FFF2-40B4-BE49-F238E27FC236}">
+                <a16:creationId xmlns:a16="http://schemas.microsoft.com/office/drawing/2014/main" id="{68C6C3C3-8F06-42B3-BD8C-5277E44487E0}"/>
+              </a:ext>
+            </a:extLst>
+          </p:cNvPr>
+          <p:cNvSpPr/>
+          <p:nvPr/>
+        </p:nvSpPr>
+        <p:spPr>
+          <a:xfrm>
+            <a:off x="685800" y="1140755"/>
+            <a:ext cx="3143809" cy="369332"/>
+          </a:xfrm>
+          <a:prstGeom prst="rect">
+            <a:avLst/>
+          </a:prstGeom>
+        </p:spPr>
+        <p:txBody>
+          <a:bodyPr wrap="none">
+            <a:spAutoFit/>
+          </a:bodyPr>
+          <a:lstStyle/>
+          <a:p>
+            <a:pPr marL="342900" indent="-342900">
+              <a:buFont typeface="Wingdings" panose="05000000000000000000" pitchFamily="2" charset="2"/>
+              <a:buChar char="v"/>
+            </a:pPr>
+            <a:r>
+              <a:rPr lang="en-US" dirty="0">
+                <a:latin typeface="Times New Roman" panose="02020603050405020304" pitchFamily="18" charset="0"/>
+                <a:ea typeface="Roboto" panose="02000000000000000000" pitchFamily="2" charset="0"/>
+                <a:cs typeface="Times New Roman" panose="02020603050405020304" pitchFamily="18" charset="0"/>
+              </a:rPr>
+              <a:t>L</a:t>
+            </a:r>
+            <a:r>
+              <a:rPr lang="vi-VN" dirty="0">
+                <a:latin typeface="Times New Roman" panose="02020603050405020304" pitchFamily="18" charset="0"/>
+                <a:ea typeface="Roboto" panose="02000000000000000000" pitchFamily="2" charset="0"/>
+                <a:cs typeface="Times New Roman" panose="02020603050405020304" pitchFamily="18" charset="0"/>
+              </a:rPr>
+              <a:t>ư</a:t>
+            </a:r>
+            <a:r>
+              <a:rPr lang="en-US" dirty="0" err="1">
+                <a:latin typeface="Times New Roman" panose="02020603050405020304" pitchFamily="18" charset="0"/>
+                <a:ea typeface="Roboto" panose="02000000000000000000" pitchFamily="2" charset="0"/>
+                <a:cs typeface="Times New Roman" panose="02020603050405020304" pitchFamily="18" charset="0"/>
+              </a:rPr>
+              <a:t>ợc</a:t>
+            </a:r>
+            <a:r>
+              <a:rPr lang="en-US" dirty="0">
+                <a:latin typeface="Times New Roman" panose="02020603050405020304" pitchFamily="18" charset="0"/>
+                <a:ea typeface="Roboto" panose="02000000000000000000" pitchFamily="2" charset="0"/>
+                <a:cs typeface="Times New Roman" panose="02020603050405020304" pitchFamily="18" charset="0"/>
+              </a:rPr>
+              <a:t> </a:t>
+            </a:r>
+            <a:r>
+              <a:rPr lang="en-US" dirty="0" err="1">
+                <a:latin typeface="Times New Roman" panose="02020603050405020304" pitchFamily="18" charset="0"/>
+                <a:ea typeface="Roboto" panose="02000000000000000000" pitchFamily="2" charset="0"/>
+                <a:cs typeface="Times New Roman" panose="02020603050405020304" pitchFamily="18" charset="0"/>
+              </a:rPr>
+              <a:t>đồ</a:t>
+            </a:r>
+            <a:r>
+              <a:rPr lang="en-US" dirty="0">
+                <a:latin typeface="Times New Roman" panose="02020603050405020304" pitchFamily="18" charset="0"/>
+                <a:ea typeface="Roboto" panose="02000000000000000000" pitchFamily="2" charset="0"/>
+                <a:cs typeface="Times New Roman" panose="02020603050405020304" pitchFamily="18" charset="0"/>
+              </a:rPr>
+              <a:t> Use case </a:t>
+            </a:r>
+            <a:r>
+              <a:rPr lang="en-US" dirty="0" err="1">
+                <a:latin typeface="Times New Roman" panose="02020603050405020304" pitchFamily="18" charset="0"/>
+                <a:ea typeface="Roboto" panose="02000000000000000000" pitchFamily="2" charset="0"/>
+                <a:cs typeface="Times New Roman" panose="02020603050405020304" pitchFamily="18" charset="0"/>
+              </a:rPr>
+              <a:t>nhân</a:t>
+            </a:r>
+            <a:r>
+              <a:rPr lang="en-US" dirty="0">
+                <a:latin typeface="Times New Roman" panose="02020603050405020304" pitchFamily="18" charset="0"/>
+                <a:ea typeface="Roboto" panose="02000000000000000000" pitchFamily="2" charset="0"/>
+                <a:cs typeface="Times New Roman" panose="02020603050405020304" pitchFamily="18" charset="0"/>
+              </a:rPr>
+              <a:t> </a:t>
+            </a:r>
+            <a:r>
+              <a:rPr lang="en-US" dirty="0" err="1">
+                <a:latin typeface="Times New Roman" panose="02020603050405020304" pitchFamily="18" charset="0"/>
+                <a:ea typeface="Roboto" panose="02000000000000000000" pitchFamily="2" charset="0"/>
+                <a:cs typeface="Times New Roman" panose="02020603050405020304" pitchFamily="18" charset="0"/>
+              </a:rPr>
+              <a:t>viên</a:t>
+            </a:r>
+            <a:endParaRPr lang="en-US" dirty="0"/>
+          </a:p>
+        </p:txBody>
+      </p:sp>
     </p:spTree>
     <p:extLst>
       <p:ext uri="{BB962C8B-B14F-4D97-AF65-F5344CB8AC3E}">

</xml_diff>

<commit_message>
add profit form and backup database
</commit_message>
<xml_diff>
--- a/DATN_PhamThiThuy.pptx
+++ b/DATN_PhamThiThuy.pptx
@@ -239,7 +239,7 @@
           <a:p>
             <a:fld id="{25DD1B1C-C497-421F-B06C-F532CF0F9785}" type="datetimeFigureOut">
               <a:rPr lang="en-US" smtClean="0"/>
-              <a:t>2020-12-16</a:t>
+              <a:t>2020-12-21</a:t>
             </a:fld>
             <a:endParaRPr lang="en-US"/>
           </a:p>
@@ -417,7 +417,7 @@
           <a:p>
             <a:fld id="{7CD4A5DF-C9ED-4331-9C0A-D1B49AAB54A9}" type="datetimeFigureOut">
               <a:rPr lang="en-US" smtClean="0"/>
-              <a:t>2020-12-16</a:t>
+              <a:t>2020-12-21</a:t>
             </a:fld>
             <a:endParaRPr lang="en-US"/>
           </a:p>
@@ -2176,7 +2176,7 @@
           <a:p>
             <a:fld id="{913B9D1B-8B7F-4F2A-BB55-C21DE162B8AE}" type="datetime1">
               <a:rPr lang="vi-VN" smtClean="0"/>
-              <a:t>16/12/2020</a:t>
+              <a:t>21/12/2020</a:t>
             </a:fld>
             <a:endParaRPr lang="en-US"/>
           </a:p>
@@ -2375,7 +2375,7 @@
           <a:p>
             <a:fld id="{54C2DB50-FFA4-4032-9F03-8BC477969725}" type="datetime1">
               <a:rPr lang="vi-VN" smtClean="0"/>
-              <a:t>16/12/2020</a:t>
+              <a:t>21/12/2020</a:t>
             </a:fld>
             <a:endParaRPr lang="en-US"/>
           </a:p>
@@ -2584,7 +2584,7 @@
           <a:p>
             <a:fld id="{ABE0B1BD-9F28-4969-BFBF-2AC2D08FF176}" type="datetime1">
               <a:rPr lang="vi-VN" smtClean="0"/>
-              <a:t>16/12/2020</a:t>
+              <a:t>21/12/2020</a:t>
             </a:fld>
             <a:endParaRPr lang="en-US"/>
           </a:p>
@@ -2783,7 +2783,7 @@
           <a:p>
             <a:fld id="{4AE99753-14BD-4C19-89AD-69A137A5857A}" type="datetime1">
               <a:rPr lang="vi-VN" smtClean="0"/>
-              <a:t>16/12/2020</a:t>
+              <a:t>21/12/2020</a:t>
             </a:fld>
             <a:endParaRPr lang="en-US"/>
           </a:p>
@@ -3059,7 +3059,7 @@
           <a:p>
             <a:fld id="{D65F6F36-BB06-4F13-9611-851319F3392B}" type="datetime1">
               <a:rPr lang="vi-VN" smtClean="0"/>
-              <a:t>16/12/2020</a:t>
+              <a:t>21/12/2020</a:t>
             </a:fld>
             <a:endParaRPr lang="en-US"/>
           </a:p>
@@ -3325,7 +3325,7 @@
           <a:p>
             <a:fld id="{17D20409-82E2-4CE7-923C-CF5475366411}" type="datetime1">
               <a:rPr lang="vi-VN" smtClean="0"/>
-              <a:t>16/12/2020</a:t>
+              <a:t>21/12/2020</a:t>
             </a:fld>
             <a:endParaRPr lang="en-US"/>
           </a:p>
@@ -3738,7 +3738,7 @@
           <a:p>
             <a:fld id="{D6B602A3-B6BD-4B11-9EF7-A6995DD1D891}" type="datetime1">
               <a:rPr lang="vi-VN" smtClean="0"/>
-              <a:t>16/12/2020</a:t>
+              <a:t>21/12/2020</a:t>
             </a:fld>
             <a:endParaRPr lang="en-US"/>
           </a:p>
@@ -3880,7 +3880,7 @@
           <a:p>
             <a:fld id="{BD5774EA-1465-4714-ABCA-238E21FB1E99}" type="datetime1">
               <a:rPr lang="vi-VN" smtClean="0"/>
-              <a:t>16/12/2020</a:t>
+              <a:t>21/12/2020</a:t>
             </a:fld>
             <a:endParaRPr lang="en-US"/>
           </a:p>
@@ -3994,7 +3994,7 @@
           <a:p>
             <a:fld id="{1393677C-A199-48B1-9AE1-138834C1B67E}" type="datetime1">
               <a:rPr lang="vi-VN" smtClean="0"/>
-              <a:t>16/12/2020</a:t>
+              <a:t>21/12/2020</a:t>
             </a:fld>
             <a:endParaRPr lang="en-US"/>
           </a:p>
@@ -4306,7 +4306,7 @@
           <a:p>
             <a:fld id="{B6459F17-2D45-4809-A88D-60C6D948D5D9}" type="datetime1">
               <a:rPr lang="vi-VN" smtClean="0"/>
-              <a:t>16/12/2020</a:t>
+              <a:t>21/12/2020</a:t>
             </a:fld>
             <a:endParaRPr lang="en-US"/>
           </a:p>
@@ -4595,7 +4595,7 @@
           <a:p>
             <a:fld id="{B806E17E-5A62-4990-8004-1AAC05D07EF7}" type="datetime1">
               <a:rPr lang="vi-VN" smtClean="0"/>
-              <a:t>16/12/2020</a:t>
+              <a:t>21/12/2020</a:t>
             </a:fld>
             <a:endParaRPr lang="en-US"/>
           </a:p>
@@ -4837,7 +4837,7 @@
           <a:p>
             <a:fld id="{32F45394-1329-4267-AC9F-AB803F30FFC4}" type="datetime1">
               <a:rPr lang="vi-VN" smtClean="0"/>
-              <a:t>16/12/2020</a:t>
+              <a:t>21/12/2020</a:t>
             </a:fld>
             <a:endParaRPr lang="en-US"/>
           </a:p>
@@ -14606,7 +14606,31 @@
                 <a:ea typeface="Roboto" panose="02000000000000000000" pitchFamily="2" charset="0"/>
                 <a:cs typeface="Times New Roman" panose="02020603050405020304" pitchFamily="18" charset="0"/>
               </a:rPr>
-              <a:t> admin</a:t>
+              <a:t> </a:t>
+            </a:r>
+            <a:r>
+              <a:rPr lang="en-US" sz="2400" dirty="0" err="1">
+                <a:latin typeface="Times New Roman" panose="02020603050405020304" pitchFamily="18" charset="0"/>
+                <a:ea typeface="Roboto" panose="02000000000000000000" pitchFamily="2" charset="0"/>
+                <a:cs typeface="Times New Roman" panose="02020603050405020304" pitchFamily="18" charset="0"/>
+              </a:rPr>
+              <a:t>nhân</a:t>
+            </a:r>
+            <a:r>
+              <a:rPr lang="en-US" sz="2400" dirty="0">
+                <a:latin typeface="Times New Roman" panose="02020603050405020304" pitchFamily="18" charset="0"/>
+                <a:ea typeface="Roboto" panose="02000000000000000000" pitchFamily="2" charset="0"/>
+                <a:cs typeface="Times New Roman" panose="02020603050405020304" pitchFamily="18" charset="0"/>
+              </a:rPr>
+              <a:t> </a:t>
+            </a:r>
+            <a:r>
+              <a:rPr lang="en-US" sz="2400" dirty="0" err="1">
+                <a:latin typeface="Times New Roman" panose="02020603050405020304" pitchFamily="18" charset="0"/>
+                <a:ea typeface="Roboto" panose="02000000000000000000" pitchFamily="2" charset="0"/>
+                <a:cs typeface="Times New Roman" panose="02020603050405020304" pitchFamily="18" charset="0"/>
+              </a:rPr>
+              <a:t>viên</a:t>
             </a:r>
             <a:endParaRPr lang="en-US" sz="2400" dirty="0"/>
           </a:p>

</xml_diff>